<commit_message>
M1 C5 P1 e M2 C3 P4
</commit_message>
<xml_diff>
--- a/curso/modulo1capitulo5-off.pptx
+++ b/curso/modulo1capitulo5-off.pptx
@@ -525,7 +525,7 @@
             <a:fld id="{6B2AED99-3A78-46C3-A4E3-29F86B3E5DC3}" type="datetimeFigureOut">
               <a:rPr lang="pt-BR" smtClean="0"/>
               <a:pPr/>
-              <a:t>12/10/2014</a:t>
+              <a:t>21/9/2015</a:t>
             </a:fld>
             <a:endParaRPr lang="pt-BR"/>
           </a:p>
@@ -692,7 +692,7 @@
             <a:fld id="{6B2AED99-3A78-46C3-A4E3-29F86B3E5DC3}" type="datetimeFigureOut">
               <a:rPr lang="pt-BR" smtClean="0"/>
               <a:pPr/>
-              <a:t>12/10/2014</a:t>
+              <a:t>21/9/2015</a:t>
             </a:fld>
             <a:endParaRPr lang="pt-BR"/>
           </a:p>
@@ -869,7 +869,7 @@
             <a:fld id="{6B2AED99-3A78-46C3-A4E3-29F86B3E5DC3}" type="datetimeFigureOut">
               <a:rPr lang="pt-BR" smtClean="0"/>
               <a:pPr/>
-              <a:t>12/10/2014</a:t>
+              <a:t>21/9/2015</a:t>
             </a:fld>
             <a:endParaRPr lang="pt-BR"/>
           </a:p>
@@ -1040,7 +1040,7 @@
             <a:fld id="{6B2AED99-3A78-46C3-A4E3-29F86B3E5DC3}" type="datetimeFigureOut">
               <a:rPr lang="pt-BR" smtClean="0"/>
               <a:pPr/>
-              <a:t>12/10/2014</a:t>
+              <a:t>21/9/2015</a:t>
             </a:fld>
             <a:endParaRPr lang="pt-BR"/>
           </a:p>
@@ -1497,7 +1497,7 @@
             <a:fld id="{6B2AED99-3A78-46C3-A4E3-29F86B3E5DC3}" type="datetimeFigureOut">
               <a:rPr lang="pt-BR" smtClean="0"/>
               <a:pPr/>
-              <a:t>12/10/2014</a:t>
+              <a:t>21/9/2015</a:t>
             </a:fld>
             <a:endParaRPr lang="pt-BR"/>
           </a:p>
@@ -1763,7 +1763,7 @@
             <a:fld id="{6B2AED99-3A78-46C3-A4E3-29F86B3E5DC3}" type="datetimeFigureOut">
               <a:rPr lang="pt-BR" smtClean="0"/>
               <a:pPr/>
-              <a:t>12/10/2014</a:t>
+              <a:t>21/9/2015</a:t>
             </a:fld>
             <a:endParaRPr lang="pt-BR"/>
           </a:p>
@@ -2139,7 +2139,7 @@
             <a:fld id="{6B2AED99-3A78-46C3-A4E3-29F86B3E5DC3}" type="datetimeFigureOut">
               <a:rPr lang="pt-BR" smtClean="0"/>
               <a:pPr/>
-              <a:t>12/10/2014</a:t>
+              <a:t>21/9/2015</a:t>
             </a:fld>
             <a:endParaRPr lang="pt-BR"/>
           </a:p>
@@ -2263,7 +2263,7 @@
             <a:fld id="{6B2AED99-3A78-46C3-A4E3-29F86B3E5DC3}" type="datetimeFigureOut">
               <a:rPr lang="pt-BR" smtClean="0"/>
               <a:pPr/>
-              <a:t>12/10/2014</a:t>
+              <a:t>21/9/2015</a:t>
             </a:fld>
             <a:endParaRPr lang="pt-BR"/>
           </a:p>
@@ -2355,7 +2355,7 @@
             <a:fld id="{6B2AED99-3A78-46C3-A4E3-29F86B3E5DC3}" type="datetimeFigureOut">
               <a:rPr lang="pt-BR" smtClean="0"/>
               <a:pPr/>
-              <a:t>12/10/2014</a:t>
+              <a:t>21/9/2015</a:t>
             </a:fld>
             <a:endParaRPr lang="pt-BR"/>
           </a:p>
@@ -2606,7 +2606,7 @@
             <a:fld id="{6B2AED99-3A78-46C3-A4E3-29F86B3E5DC3}" type="datetimeFigureOut">
               <a:rPr lang="pt-BR" smtClean="0"/>
               <a:pPr/>
-              <a:t>12/10/2014</a:t>
+              <a:t>21/9/2015</a:t>
             </a:fld>
             <a:endParaRPr lang="pt-BR"/>
           </a:p>
@@ -2867,7 +2867,7 @@
             <a:fld id="{6B2AED99-3A78-46C3-A4E3-29F86B3E5DC3}" type="datetimeFigureOut">
               <a:rPr lang="pt-BR" smtClean="0"/>
               <a:pPr/>
-              <a:t>12/10/2014</a:t>
+              <a:t>21/9/2015</a:t>
             </a:fld>
             <a:endParaRPr lang="pt-BR"/>
           </a:p>
@@ -3273,7 +3273,7 @@
             <a:fld id="{6B2AED99-3A78-46C3-A4E3-29F86B3E5DC3}" type="datetimeFigureOut">
               <a:rPr lang="pt-BR" smtClean="0"/>
               <a:pPr/>
-              <a:t>12/10/2014</a:t>
+              <a:t>21/9/2015</a:t>
             </a:fld>
             <a:endParaRPr lang="pt-BR"/>
           </a:p>
@@ -5199,7 +5199,11 @@
             <a:pPr lvl="1"/>
             <a:r>
               <a:rPr lang="pt-BR" dirty="0" err="1" smtClean="0"/>
-              <a:t>ArrayList</a:t>
+              <a:t>List</a:t>
+            </a:r>
+            <a:r>
+              <a:rPr lang="pt-BR" dirty="0" smtClean="0"/>
+              <a:t>&lt;T&gt;</a:t>
             </a:r>
             <a:endParaRPr lang="pt-BR" dirty="0" smtClean="0"/>
           </a:p>
@@ -6122,7 +6126,11 @@
           <a:p>
             <a:r>
               <a:rPr lang="pt-BR" dirty="0" err="1" smtClean="0"/>
-              <a:t>ArrayList</a:t>
+              <a:t>List</a:t>
+            </a:r>
+            <a:r>
+              <a:rPr lang="pt-BR" dirty="0" smtClean="0"/>
+              <a:t>&lt;T&gt;</a:t>
             </a:r>
             <a:endParaRPr lang="pt-BR" dirty="0"/>
           </a:p>
@@ -6140,7 +6148,9 @@
         </p:nvSpPr>
         <p:spPr/>
         <p:txBody>
-          <a:bodyPr/>
+          <a:bodyPr>
+            <a:normAutofit fontScale="92500" lnSpcReduction="10000"/>
+          </a:bodyPr>
           <a:lstStyle/>
           <a:p>
             <a:r>
@@ -6155,19 +6165,7 @@
                 <a:latin typeface="Courier New" pitchFamily="49" charset="0"/>
                 <a:cs typeface="Courier New" pitchFamily="49" charset="0"/>
               </a:rPr>
-              <a:t>ArrayList</a:t>
-            </a:r>
-            <a:r>
-              <a:rPr lang="pt-BR" dirty="0" smtClean="0"/>
-              <a:t> que está no </a:t>
-            </a:r>
-            <a:r>
-              <a:rPr lang="pt-BR" dirty="0" err="1" smtClean="0"/>
-              <a:t>namespace</a:t>
-            </a:r>
-            <a:r>
-              <a:rPr lang="pt-BR" dirty="0" smtClean="0"/>
-              <a:t> </a:t>
+              <a:t>List</a:t>
             </a:r>
             <a:r>
               <a:rPr lang="pt-BR" b="1" dirty="0" smtClean="0">
@@ -6177,6 +6175,32 @@
                 <a:latin typeface="Courier New" pitchFamily="49" charset="0"/>
                 <a:cs typeface="Courier New" pitchFamily="49" charset="0"/>
               </a:rPr>
+              <a:t>&lt;T&gt;</a:t>
+            </a:r>
+            <a:r>
+              <a:rPr lang="pt-BR" dirty="0" smtClean="0"/>
+              <a:t> </a:t>
+            </a:r>
+            <a:r>
+              <a:rPr lang="pt-BR" dirty="0" smtClean="0"/>
+              <a:t>que está no </a:t>
+            </a:r>
+            <a:r>
+              <a:rPr lang="pt-BR" dirty="0" err="1" smtClean="0"/>
+              <a:t>namespace</a:t>
+            </a:r>
+            <a:r>
+              <a:rPr lang="pt-BR" dirty="0" smtClean="0"/>
+              <a:t> </a:t>
+            </a:r>
+            <a:r>
+              <a:rPr lang="pt-BR" b="1" dirty="0" smtClean="0">
+                <a:solidFill>
+                  <a:srgbClr val="92D050"/>
+                </a:solidFill>
+                <a:latin typeface="Courier New" pitchFamily="49" charset="0"/>
+                <a:cs typeface="Courier New" pitchFamily="49" charset="0"/>
+              </a:rPr>
               <a:t>System.</a:t>
             </a:r>
             <a:r>
@@ -6188,6 +6212,26 @@
                 <a:cs typeface="Courier New" pitchFamily="49" charset="0"/>
               </a:rPr>
               <a:t>Collections</a:t>
+            </a:r>
+            <a:r>
+              <a:rPr lang="pt-BR" b="1" dirty="0" smtClean="0">
+                <a:solidFill>
+                  <a:srgbClr val="92D050"/>
+                </a:solidFill>
+                <a:latin typeface="Courier New" pitchFamily="49" charset="0"/>
+                <a:cs typeface="Courier New" pitchFamily="49" charset="0"/>
+              </a:rPr>
+              <a:t>.</a:t>
+            </a:r>
+            <a:r>
+              <a:rPr lang="pt-BR" b="1" dirty="0" err="1" smtClean="0">
+                <a:solidFill>
+                  <a:srgbClr val="92D050"/>
+                </a:solidFill>
+                <a:latin typeface="Courier New" pitchFamily="49" charset="0"/>
+                <a:cs typeface="Courier New" pitchFamily="49" charset="0"/>
+              </a:rPr>
+              <a:t>Generic</a:t>
             </a:r>
             <a:endParaRPr lang="pt-BR" b="1" dirty="0" smtClean="0">
               <a:solidFill>
@@ -6199,8 +6243,27 @@
           </a:p>
           <a:p>
             <a:r>
-              <a:rPr lang="pt-BR" dirty="0" smtClean="0"/>
-              <a:t>Pode ser declarado de duas formas:</a:t>
+              <a:rPr lang="pt-BR" dirty="0" smtClean="0">
+                <a:solidFill>
+                  <a:srgbClr val="92D050"/>
+                </a:solidFill>
+              </a:rPr>
+              <a:t>T</a:t>
+            </a:r>
+            <a:r>
+              <a:rPr lang="pt-BR" dirty="0" smtClean="0"/>
+              <a:t> indica o tipo de cada elemento</a:t>
+            </a:r>
+            <a:endParaRPr lang="pt-BR" dirty="0" smtClean="0"/>
+          </a:p>
+          <a:p>
+            <a:r>
+              <a:rPr lang="pt-BR" dirty="0" smtClean="0"/>
+              <a:t>Pode </a:t>
+            </a:r>
+            <a:r>
+              <a:rPr lang="pt-BR" dirty="0" smtClean="0"/>
+              <a:t>ser declarado de duas formas:</a:t>
             </a:r>
           </a:p>
           <a:p>
@@ -6231,92 +6294,159 @@
                 <a:latin typeface="Courier New" pitchFamily="49" charset="0"/>
                 <a:cs typeface="Courier New" pitchFamily="49" charset="0"/>
               </a:rPr>
-              <a:t>ArrayList</a:t>
+              <a:t>Generic</a:t>
             </a:r>
             <a:r>
               <a:rPr lang="pt-BR" b="1" dirty="0" smtClean="0">
                 <a:latin typeface="Courier New" pitchFamily="49" charset="0"/>
                 <a:cs typeface="Courier New" pitchFamily="49" charset="0"/>
               </a:rPr>
+              <a:t>.</a:t>
+            </a:r>
+            <a:r>
+              <a:rPr lang="pt-BR" b="1" dirty="0" err="1" smtClean="0">
+                <a:latin typeface="Courier New" pitchFamily="49" charset="0"/>
+                <a:cs typeface="Courier New" pitchFamily="49" charset="0"/>
+              </a:rPr>
+              <a:t>List</a:t>
+            </a:r>
+            <a:r>
+              <a:rPr lang="pt-BR" b="1" dirty="0" smtClean="0">
+                <a:latin typeface="Courier New" pitchFamily="49" charset="0"/>
+                <a:cs typeface="Courier New" pitchFamily="49" charset="0"/>
+              </a:rPr>
+              <a:t>&lt;</a:t>
+            </a:r>
+            <a:r>
+              <a:rPr lang="pt-BR" b="1" dirty="0" err="1" smtClean="0">
+                <a:latin typeface="Courier New" pitchFamily="49" charset="0"/>
+                <a:cs typeface="Courier New" pitchFamily="49" charset="0"/>
+              </a:rPr>
+              <a:t>int</a:t>
+            </a:r>
+            <a:r>
+              <a:rPr lang="pt-BR" b="1" dirty="0" smtClean="0">
+                <a:latin typeface="Courier New" pitchFamily="49" charset="0"/>
+                <a:cs typeface="Courier New" pitchFamily="49" charset="0"/>
+              </a:rPr>
+              <a:t>&gt; </a:t>
+            </a:r>
+            <a:r>
+              <a:rPr lang="pt-BR" b="1" dirty="0" err="1" smtClean="0">
+                <a:latin typeface="Courier New" pitchFamily="49" charset="0"/>
+                <a:cs typeface="Courier New" pitchFamily="49" charset="0"/>
+              </a:rPr>
+              <a:t>dinamico</a:t>
+            </a:r>
+            <a:r>
+              <a:rPr lang="pt-BR" b="1" dirty="0" smtClean="0">
+                <a:latin typeface="Courier New" pitchFamily="49" charset="0"/>
+                <a:cs typeface="Courier New" pitchFamily="49" charset="0"/>
+              </a:rPr>
+              <a:t>;</a:t>
+            </a:r>
+          </a:p>
+          <a:p>
+            <a:r>
+              <a:rPr lang="pt-BR" dirty="0" smtClean="0"/>
+              <a:t>Ou</a:t>
+            </a:r>
+          </a:p>
+          <a:p>
+            <a:pPr lvl="1"/>
+            <a:r>
+              <a:rPr lang="pt-BR" b="1" dirty="0" err="1" smtClean="0">
+                <a:latin typeface="Courier New" pitchFamily="49" charset="0"/>
+                <a:cs typeface="Courier New" pitchFamily="49" charset="0"/>
+              </a:rPr>
+              <a:t>using</a:t>
+            </a:r>
+            <a:r>
+              <a:rPr lang="pt-BR" b="1" dirty="0" smtClean="0">
+                <a:latin typeface="Courier New" pitchFamily="49" charset="0"/>
+                <a:cs typeface="Courier New" pitchFamily="49" charset="0"/>
+              </a:rPr>
               <a:t> </a:t>
             </a:r>
             <a:r>
+              <a:rPr lang="pt-BR" b="1" dirty="0" smtClean="0">
+                <a:latin typeface="Courier New" pitchFamily="49" charset="0"/>
+                <a:cs typeface="Courier New" pitchFamily="49" charset="0"/>
+              </a:rPr>
+              <a:t>System.</a:t>
+            </a:r>
+            <a:r>
               <a:rPr lang="pt-BR" b="1" dirty="0" err="1" smtClean="0">
                 <a:latin typeface="Courier New" pitchFamily="49" charset="0"/>
                 <a:cs typeface="Courier New" pitchFamily="49" charset="0"/>
               </a:rPr>
-              <a:t>dinamico</a:t>
+              <a:t>Collections</a:t>
             </a:r>
             <a:r>
               <a:rPr lang="pt-BR" b="1" dirty="0" smtClean="0">
                 <a:latin typeface="Courier New" pitchFamily="49" charset="0"/>
                 <a:cs typeface="Courier New" pitchFamily="49" charset="0"/>
               </a:rPr>
+              <a:t>.</a:t>
+            </a:r>
+            <a:r>
+              <a:rPr lang="pt-BR" b="1" dirty="0" err="1" smtClean="0">
+                <a:latin typeface="Courier New" pitchFamily="49" charset="0"/>
+                <a:cs typeface="Courier New" pitchFamily="49" charset="0"/>
+              </a:rPr>
+              <a:t>Generic</a:t>
+            </a:r>
+            <a:r>
+              <a:rPr lang="pt-BR" b="1" dirty="0" smtClean="0">
+                <a:latin typeface="Courier New" pitchFamily="49" charset="0"/>
+                <a:cs typeface="Courier New" pitchFamily="49" charset="0"/>
+              </a:rPr>
               <a:t>;</a:t>
             </a:r>
-          </a:p>
-          <a:p>
-            <a:r>
-              <a:rPr lang="pt-BR" dirty="0" smtClean="0"/>
-              <a:t>Ou</a:t>
-            </a:r>
+            <a:endParaRPr lang="pt-BR" b="1" dirty="0" smtClean="0">
+              <a:latin typeface="Courier New" pitchFamily="49" charset="0"/>
+              <a:cs typeface="Courier New" pitchFamily="49" charset="0"/>
+            </a:endParaRPr>
           </a:p>
           <a:p>
             <a:pPr lvl="1"/>
             <a:r>
+              <a:rPr lang="pt-BR" b="1" dirty="0" smtClean="0">
+                <a:latin typeface="Courier New" pitchFamily="49" charset="0"/>
+                <a:cs typeface="Courier New" pitchFamily="49" charset="0"/>
+              </a:rPr>
+              <a:t>...</a:t>
+            </a:r>
+          </a:p>
+          <a:p>
+            <a:pPr lvl="1"/>
+            <a:r>
               <a:rPr lang="pt-BR" b="1" dirty="0" err="1" smtClean="0">
                 <a:latin typeface="Courier New" pitchFamily="49" charset="0"/>
                 <a:cs typeface="Courier New" pitchFamily="49" charset="0"/>
               </a:rPr>
-              <a:t>using</a:t>
+              <a:t>List</a:t>
             </a:r>
             <a:r>
               <a:rPr lang="pt-BR" b="1" dirty="0" smtClean="0">
                 <a:latin typeface="Courier New" pitchFamily="49" charset="0"/>
                 <a:cs typeface="Courier New" pitchFamily="49" charset="0"/>
               </a:rPr>
-              <a:t> System.</a:t>
+              <a:t>&lt;</a:t>
             </a:r>
             <a:r>
               <a:rPr lang="pt-BR" b="1" dirty="0" err="1" smtClean="0">
                 <a:latin typeface="Courier New" pitchFamily="49" charset="0"/>
                 <a:cs typeface="Courier New" pitchFamily="49" charset="0"/>
               </a:rPr>
-              <a:t>Collections</a:t>
+              <a:t>int</a:t>
             </a:r>
             <a:r>
               <a:rPr lang="pt-BR" b="1" dirty="0" smtClean="0">
                 <a:latin typeface="Courier New" pitchFamily="49" charset="0"/>
                 <a:cs typeface="Courier New" pitchFamily="49" charset="0"/>
               </a:rPr>
-              <a:t>;</a:t>
-            </a:r>
-          </a:p>
-          <a:p>
-            <a:pPr lvl="1"/>
-            <a:r>
-              <a:rPr lang="pt-BR" b="1" dirty="0" smtClean="0">
-                <a:latin typeface="Courier New" pitchFamily="49" charset="0"/>
-                <a:cs typeface="Courier New" pitchFamily="49" charset="0"/>
-              </a:rPr>
-              <a:t>...</a:t>
-            </a:r>
-          </a:p>
-          <a:p>
-            <a:pPr lvl="1"/>
-            <a:r>
-              <a:rPr lang="pt-BR" b="1" dirty="0" err="1" smtClean="0">
-                <a:latin typeface="Courier New" pitchFamily="49" charset="0"/>
-                <a:cs typeface="Courier New" pitchFamily="49" charset="0"/>
-              </a:rPr>
-              <a:t>ArrayList</a:t>
-            </a:r>
-            <a:r>
-              <a:rPr lang="pt-BR" b="1" dirty="0" smtClean="0">
-                <a:latin typeface="Courier New" pitchFamily="49" charset="0"/>
-                <a:cs typeface="Courier New" pitchFamily="49" charset="0"/>
-              </a:rPr>
-              <a:t> </a:t>
+              <a:t>&gt; </a:t>
             </a:r>
             <a:r>
               <a:rPr lang="pt-BR" b="1" dirty="0" err="1" smtClean="0">
@@ -6377,7 +6507,11 @@
           <a:p>
             <a:r>
               <a:rPr lang="pt-BR" dirty="0" err="1" smtClean="0"/>
-              <a:t>ArrayList</a:t>
+              <a:t>List</a:t>
+            </a:r>
+            <a:r>
+              <a:rPr lang="pt-BR" dirty="0" smtClean="0"/>
+              <a:t>&lt;T&gt;</a:t>
             </a:r>
             <a:endParaRPr lang="pt-BR" dirty="0"/>
           </a:p>
@@ -6396,7 +6530,7 @@
         <p:spPr/>
         <p:txBody>
           <a:bodyPr>
-            <a:normAutofit fontScale="92500" lnSpcReduction="10000"/>
+            <a:normAutofit lnSpcReduction="10000"/>
           </a:bodyPr>
           <a:lstStyle/>
           <a:p>
@@ -6406,11 +6540,15 @@
             </a:r>
             <a:r>
               <a:rPr lang="pt-BR" dirty="0" err="1" smtClean="0"/>
-              <a:t>ArrayList</a:t>
-            </a:r>
-            <a:r>
-              <a:rPr lang="pt-BR" dirty="0" smtClean="0"/>
-              <a:t> funciona bem com tipos básicos:</a:t>
+              <a:t>List</a:t>
+            </a:r>
+            <a:r>
+              <a:rPr lang="pt-BR" dirty="0" smtClean="0"/>
+              <a:t>&lt;T&gt; </a:t>
+            </a:r>
+            <a:r>
+              <a:rPr lang="pt-BR" dirty="0" smtClean="0"/>
+              <a:t>funciona bem com tipos básicos:</a:t>
             </a:r>
           </a:p>
           <a:p>
@@ -6475,21 +6613,9 @@
           <a:p>
             <a:r>
               <a:rPr lang="pt-BR" dirty="0" smtClean="0"/>
-              <a:t>Para tipos complexos, é necessário o uso de </a:t>
-            </a:r>
-            <a:r>
-              <a:rPr lang="pt-BR" dirty="0" err="1" smtClean="0">
-                <a:solidFill>
-                  <a:srgbClr val="92D050"/>
-                </a:solidFill>
-              </a:rPr>
-              <a:t>cast</a:t>
-            </a:r>
-            <a:endParaRPr lang="pt-BR" dirty="0" smtClean="0">
-              <a:solidFill>
-                <a:srgbClr val="92D050"/>
-              </a:solidFill>
-            </a:endParaRPr>
+              <a:t>E também com tipos complexos!</a:t>
+            </a:r>
+            <a:endParaRPr lang="pt-BR" dirty="0" smtClean="0"/>
           </a:p>
           <a:p>
             <a:r>
@@ -6544,15 +6670,33 @@
                 <a:latin typeface="Courier New" pitchFamily="49" charset="0"/>
                 <a:cs typeface="Courier New" pitchFamily="49" charset="0"/>
               </a:rPr>
-              <a:t>ArrayList</a:t>
+              <a:t>List</a:t>
             </a:r>
             <a:r>
               <a:rPr lang="pt-BR" b="1" dirty="0" smtClean="0">
                 <a:latin typeface="Courier New" pitchFamily="49" charset="0"/>
                 <a:cs typeface="Courier New" pitchFamily="49" charset="0"/>
               </a:rPr>
-              <a:t>();</a:t>
-            </a:r>
+              <a:t>&lt;</a:t>
+            </a:r>
+            <a:r>
+              <a:rPr lang="pt-BR" b="1" dirty="0" err="1" smtClean="0">
+                <a:latin typeface="Courier New" pitchFamily="49" charset="0"/>
+                <a:cs typeface="Courier New" pitchFamily="49" charset="0"/>
+              </a:rPr>
+              <a:t>int</a:t>
+            </a:r>
+            <a:r>
+              <a:rPr lang="pt-BR" b="1" dirty="0" smtClean="0">
+                <a:latin typeface="Courier New" pitchFamily="49" charset="0"/>
+                <a:cs typeface="Courier New" pitchFamily="49" charset="0"/>
+              </a:rPr>
+              <a:t>&gt;();</a:t>
+            </a:r>
+            <a:endParaRPr lang="pt-BR" b="1" dirty="0" smtClean="0">
+              <a:latin typeface="Courier New" pitchFamily="49" charset="0"/>
+              <a:cs typeface="Courier New" pitchFamily="49" charset="0"/>
+            </a:endParaRPr>
           </a:p>
           <a:p>
             <a:r>
@@ -6634,7 +6778,11 @@
           <a:p>
             <a:r>
               <a:rPr lang="pt-BR" dirty="0" err="1" smtClean="0"/>
-              <a:t>ArrayList</a:t>
+              <a:t>List</a:t>
+            </a:r>
+            <a:r>
+              <a:rPr lang="pt-BR" dirty="0" smtClean="0"/>
+              <a:t>&lt;T&gt;</a:t>
             </a:r>
             <a:endParaRPr lang="pt-BR" dirty="0"/>
           </a:p>
@@ -6830,7 +6978,11 @@
           <a:p>
             <a:r>
               <a:rPr lang="pt-BR" dirty="0" err="1" smtClean="0"/>
-              <a:t>ArrayList</a:t>
+              <a:t>List</a:t>
+            </a:r>
+            <a:r>
+              <a:rPr lang="pt-BR" dirty="0" smtClean="0"/>
+              <a:t>&lt;T&gt;</a:t>
             </a:r>
             <a:endParaRPr lang="pt-BR" dirty="0"/>
           </a:p>
@@ -7177,7 +7329,11 @@
           <a:p>
             <a:r>
               <a:rPr lang="pt-BR" dirty="0" err="1" smtClean="0"/>
-              <a:t>ArrayList</a:t>
+              <a:t>List</a:t>
+            </a:r>
+            <a:r>
+              <a:rPr lang="pt-BR" dirty="0" smtClean="0"/>
+              <a:t>&lt;T&gt;</a:t>
             </a:r>
             <a:endParaRPr lang="pt-BR" dirty="0"/>
           </a:p>
@@ -7356,7 +7512,11 @@
           <a:p>
             <a:r>
               <a:rPr lang="pt-BR" dirty="0" err="1" smtClean="0"/>
-              <a:t>ArrayList</a:t>
+              <a:t>List</a:t>
+            </a:r>
+            <a:r>
+              <a:rPr lang="pt-BR" dirty="0" smtClean="0"/>
+              <a:t>&lt;T&gt;</a:t>
             </a:r>
             <a:endParaRPr lang="pt-BR" dirty="0"/>
           </a:p>
@@ -7494,7 +7654,11 @@
           <a:p>
             <a:r>
               <a:rPr lang="pt-BR" dirty="0" err="1" smtClean="0"/>
-              <a:t>ArrayList</a:t>
+              <a:t>List</a:t>
+            </a:r>
+            <a:r>
+              <a:rPr lang="pt-BR" dirty="0" smtClean="0"/>
+              <a:t>&lt;T&gt;</a:t>
             </a:r>
             <a:endParaRPr lang="pt-BR" dirty="0"/>
           </a:p>
@@ -7971,14 +8135,7 @@
                 <a:latin typeface="Courier New" pitchFamily="49" charset="0"/>
                 <a:cs typeface="Courier New" pitchFamily="49" charset="0"/>
               </a:rPr>
-              <a:t>f</a:t>
-            </a:r>
-            <a:r>
-              <a:rPr lang="pt-BR" b="1" dirty="0" err="1" smtClean="0">
-                <a:latin typeface="Courier New" pitchFamily="49" charset="0"/>
-                <a:cs typeface="Courier New" pitchFamily="49" charset="0"/>
-              </a:rPr>
-              <a:t>oreach</a:t>
+              <a:t>foreach</a:t>
             </a:r>
             <a:r>
               <a:rPr lang="pt-BR" b="1" dirty="0" smtClean="0">

</xml_diff>